<commit_message>
Updated on 12 April 2020 2.03AM
</commit_message>
<xml_diff>
--- a/docs/images/Sequence/Sequence.pptx
+++ b/docs/images/Sequence/Sequence.pptx
@@ -6,7 +6,7 @@
     <p:sldMasterId id="2147483669" r:id="rId2"/>
   </p:sldMasterIdLst>
   <p:notesMasterIdLst>
-    <p:notesMasterId r:id="rId34"/>
+    <p:notesMasterId r:id="rId30"/>
   </p:notesMasterIdLst>
   <p:sldIdLst>
     <p:sldId id="256" r:id="rId3"/>
@@ -34,12 +34,8 @@
     <p:sldId id="275" r:id="rId25"/>
     <p:sldId id="277" r:id="rId26"/>
     <p:sldId id="278" r:id="rId27"/>
-    <p:sldId id="279" r:id="rId28"/>
-    <p:sldId id="283" r:id="rId29"/>
-    <p:sldId id="284" r:id="rId30"/>
-    <p:sldId id="280" r:id="rId31"/>
-    <p:sldId id="281" r:id="rId32"/>
-    <p:sldId id="282" r:id="rId33"/>
+    <p:sldId id="284" r:id="rId28"/>
+    <p:sldId id="280" r:id="rId29"/>
   </p:sldIdLst>
   <p:sldSz cx="12192000" cy="6858000"/>
   <p:notesSz cx="6858000" cy="9144000"/>
@@ -228,7 +224,7 @@
           <a:p>
             <a:fld id="{4520374D-A10D-4F16-A346-D54563820891}" type="datetimeFigureOut">
               <a:rPr lang="en-MY" smtClean="0"/>
-              <a:t>3/4/2020</a:t>
+              <a:t>11/4/2020</a:t>
             </a:fld>
             <a:endParaRPr lang="en-MY"/>
           </a:p>
@@ -666,7 +662,7 @@
           <a:p>
             <a:fld id="{48A87A34-81AB-432B-8DAE-1953F412C126}" type="datetimeFigureOut">
               <a:rPr lang="en-US" dirty="0"/>
-              <a:t>4/3/2020</a:t>
+              <a:t>4/11/2020</a:t>
             </a:fld>
             <a:endParaRPr lang="en-US" dirty="0"/>
           </a:p>
@@ -928,7 +924,7 @@
           <a:p>
             <a:fld id="{48A87A34-81AB-432B-8DAE-1953F412C126}" type="datetimeFigureOut">
               <a:rPr lang="en-US" dirty="0"/>
-              <a:t>4/3/2020</a:t>
+              <a:t>4/11/2020</a:t>
             </a:fld>
             <a:endParaRPr lang="en-US" dirty="0"/>
           </a:p>
@@ -1155,7 +1151,7 @@
             <a:fld id="{48A87A34-81AB-432B-8DAE-1953F412C126}" type="datetimeFigureOut">
               <a:rPr lang="en-US" dirty="0"/>
               <a:pPr/>
-              <a:t>4/3/2020</a:t>
+              <a:t>4/11/2020</a:t>
             </a:fld>
             <a:endParaRPr lang="en-US" dirty="0"/>
           </a:p>
@@ -1461,7 +1457,7 @@
             <a:fld id="{48A87A34-81AB-432B-8DAE-1953F412C126}" type="datetimeFigureOut">
               <a:rPr lang="en-US" dirty="0"/>
               <a:pPr/>
-              <a:t>4/3/2020</a:t>
+              <a:t>4/11/2020</a:t>
             </a:fld>
             <a:endParaRPr lang="en-US" dirty="0"/>
           </a:p>
@@ -1930,7 +1926,7 @@
             <a:fld id="{48A87A34-81AB-432B-8DAE-1953F412C126}" type="datetimeFigureOut">
               <a:rPr lang="en-US" dirty="0"/>
               <a:pPr/>
-              <a:t>4/3/2020</a:t>
+              <a:t>4/11/2020</a:t>
             </a:fld>
             <a:endParaRPr lang="en-US" dirty="0"/>
           </a:p>
@@ -2472,7 +2468,7 @@
           <a:p>
             <a:fld id="{48A87A34-81AB-432B-8DAE-1953F412C126}" type="datetimeFigureOut">
               <a:rPr lang="en-US" dirty="0"/>
-              <a:t>4/3/2020</a:t>
+              <a:t>4/11/2020</a:t>
             </a:fld>
             <a:endParaRPr lang="en-US" dirty="0"/>
           </a:p>
@@ -3241,7 +3237,7 @@
           <a:p>
             <a:fld id="{48A87A34-81AB-432B-8DAE-1953F412C126}" type="datetimeFigureOut">
               <a:rPr lang="en-US" dirty="0"/>
-              <a:t>4/3/2020</a:t>
+              <a:t>4/11/2020</a:t>
             </a:fld>
             <a:endParaRPr lang="en-US" dirty="0"/>
           </a:p>
@@ -3411,7 +3407,7 @@
           <a:p>
             <a:fld id="{48A87A34-81AB-432B-8DAE-1953F412C126}" type="datetimeFigureOut">
               <a:rPr lang="en-US" dirty="0"/>
-              <a:t>4/3/2020</a:t>
+              <a:t>4/11/2020</a:t>
             </a:fld>
             <a:endParaRPr lang="en-US" dirty="0"/>
           </a:p>
@@ -3630,7 +3626,7 @@
             <a:fld id="{48A87A34-81AB-432B-8DAE-1953F412C126}" type="datetimeFigureOut">
               <a:rPr lang="en-US" dirty="0"/>
               <a:pPr/>
-              <a:t>4/3/2020</a:t>
+              <a:t>4/11/2020</a:t>
             </a:fld>
             <a:endParaRPr lang="en-US" dirty="0"/>
           </a:p>
@@ -3866,7 +3862,7 @@
           <a:p>
             <a:fld id="{48A87A34-81AB-432B-8DAE-1953F412C126}" type="datetimeFigureOut">
               <a:rPr lang="en-US" smtClean="0"/>
-              <a:t>4/3/2020</a:t>
+              <a:t>4/11/2020</a:t>
             </a:fld>
             <a:endParaRPr lang="en-US" dirty="0"/>
           </a:p>
@@ -4046,7 +4042,7 @@
           <a:p>
             <a:fld id="{48A87A34-81AB-432B-8DAE-1953F412C126}" type="datetimeFigureOut">
               <a:rPr lang="en-US" smtClean="0"/>
-              <a:t>4/3/2020</a:t>
+              <a:t>4/11/2020</a:t>
             </a:fld>
             <a:endParaRPr lang="en-US" dirty="0"/>
           </a:p>
@@ -4216,7 +4212,7 @@
           <a:p>
             <a:fld id="{48A87A34-81AB-432B-8DAE-1953F412C126}" type="datetimeFigureOut">
               <a:rPr lang="en-US" dirty="0"/>
-              <a:t>4/3/2020</a:t>
+              <a:t>4/11/2020</a:t>
             </a:fld>
             <a:endParaRPr lang="en-US" dirty="0"/>
           </a:p>
@@ -4501,7 +4497,7 @@
             <a:fld id="{48A87A34-81AB-432B-8DAE-1953F412C126}" type="datetimeFigureOut">
               <a:rPr lang="en-US" smtClean="0"/>
               <a:pPr/>
-              <a:t>4/3/2020</a:t>
+              <a:t>4/11/2020</a:t>
             </a:fld>
             <a:endParaRPr lang="en-US" dirty="0"/>
           </a:p>
@@ -4743,7 +4739,7 @@
           <a:p>
             <a:fld id="{48A87A34-81AB-432B-8DAE-1953F412C126}" type="datetimeFigureOut">
               <a:rPr lang="en-US" smtClean="0"/>
-              <a:t>4/3/2020</a:t>
+              <a:t>4/11/2020</a:t>
             </a:fld>
             <a:endParaRPr lang="en-US" dirty="0"/>
           </a:p>
@@ -5122,7 +5118,7 @@
           <a:p>
             <a:fld id="{48A87A34-81AB-432B-8DAE-1953F412C126}" type="datetimeFigureOut">
               <a:rPr lang="en-US" smtClean="0"/>
-              <a:t>4/3/2020</a:t>
+              <a:t>4/11/2020</a:t>
             </a:fld>
             <a:endParaRPr lang="en-US" dirty="0"/>
           </a:p>
@@ -5240,7 +5236,7 @@
           <a:p>
             <a:fld id="{48A87A34-81AB-432B-8DAE-1953F412C126}" type="datetimeFigureOut">
               <a:rPr lang="en-US" smtClean="0"/>
-              <a:t>4/3/2020</a:t>
+              <a:t>4/11/2020</a:t>
             </a:fld>
             <a:endParaRPr lang="en-US" dirty="0"/>
           </a:p>
@@ -5335,7 +5331,7 @@
           <a:p>
             <a:fld id="{48A87A34-81AB-432B-8DAE-1953F412C126}" type="datetimeFigureOut">
               <a:rPr lang="en-US" smtClean="0"/>
-              <a:t>4/3/2020</a:t>
+              <a:t>4/11/2020</a:t>
             </a:fld>
             <a:endParaRPr lang="en-US" dirty="0"/>
           </a:p>
@@ -5584,7 +5580,7 @@
           <a:p>
             <a:fld id="{48A87A34-81AB-432B-8DAE-1953F412C126}" type="datetimeFigureOut">
               <a:rPr lang="en-US" smtClean="0"/>
-              <a:t>4/3/2020</a:t>
+              <a:t>4/11/2020</a:t>
             </a:fld>
             <a:endParaRPr lang="en-US" dirty="0"/>
           </a:p>
@@ -5841,7 +5837,7 @@
           <a:p>
             <a:fld id="{48A87A34-81AB-432B-8DAE-1953F412C126}" type="datetimeFigureOut">
               <a:rPr lang="en-US" smtClean="0"/>
-              <a:t>4/3/2020</a:t>
+              <a:t>4/11/2020</a:t>
             </a:fld>
             <a:endParaRPr lang="en-US" dirty="0"/>
           </a:p>
@@ -6098,7 +6094,7 @@
           <a:p>
             <a:fld id="{48A87A34-81AB-432B-8DAE-1953F412C126}" type="datetimeFigureOut">
               <a:rPr lang="en-US" smtClean="0"/>
-              <a:t>4/3/2020</a:t>
+              <a:t>4/11/2020</a:t>
             </a:fld>
             <a:endParaRPr lang="en-US" dirty="0"/>
           </a:p>
@@ -6330,7 +6326,7 @@
             <a:fld id="{48A87A34-81AB-432B-8DAE-1953F412C126}" type="datetimeFigureOut">
               <a:rPr lang="en-US" smtClean="0"/>
               <a:pPr/>
-              <a:t>4/3/2020</a:t>
+              <a:t>4/11/2020</a:t>
             </a:fld>
             <a:endParaRPr lang="en-US" dirty="0"/>
           </a:p>
@@ -6641,7 +6637,7 @@
             <a:fld id="{48A87A34-81AB-432B-8DAE-1953F412C126}" type="datetimeFigureOut">
               <a:rPr lang="en-US" smtClean="0"/>
               <a:pPr/>
-              <a:t>4/3/2020</a:t>
+              <a:t>4/11/2020</a:t>
             </a:fld>
             <a:endParaRPr lang="en-US" dirty="0"/>
           </a:p>
@@ -7173,7 +7169,7 @@
             <a:fld id="{48A87A34-81AB-432B-8DAE-1953F412C126}" type="datetimeFigureOut">
               <a:rPr lang="en-US" dirty="0"/>
               <a:pPr/>
-              <a:t>4/3/2020</a:t>
+              <a:t>4/11/2020</a:t>
             </a:fld>
             <a:endParaRPr lang="en-US" dirty="0"/>
           </a:p>
@@ -7410,7 +7406,7 @@
             <a:fld id="{48A87A34-81AB-432B-8DAE-1953F412C126}" type="datetimeFigureOut">
               <a:rPr lang="en-US" smtClean="0"/>
               <a:pPr/>
-              <a:t>4/3/2020</a:t>
+              <a:t>4/11/2020</a:t>
             </a:fld>
             <a:endParaRPr lang="en-US" dirty="0"/>
           </a:p>
@@ -7957,7 +7953,7 @@
           <a:p>
             <a:fld id="{48A87A34-81AB-432B-8DAE-1953F412C126}" type="datetimeFigureOut">
               <a:rPr lang="en-US" smtClean="0"/>
-              <a:t>4/3/2020</a:t>
+              <a:t>4/11/2020</a:t>
             </a:fld>
             <a:endParaRPr lang="en-US" dirty="0"/>
           </a:p>
@@ -8731,7 +8727,7 @@
           <a:p>
             <a:fld id="{48A87A34-81AB-432B-8DAE-1953F412C126}" type="datetimeFigureOut">
               <a:rPr lang="en-US" smtClean="0"/>
-              <a:t>4/3/2020</a:t>
+              <a:t>4/11/2020</a:t>
             </a:fld>
             <a:endParaRPr lang="en-US" dirty="0"/>
           </a:p>
@@ -8906,7 +8902,7 @@
           <a:p>
             <a:fld id="{48A87A34-81AB-432B-8DAE-1953F412C126}" type="datetimeFigureOut">
               <a:rPr lang="en-US" smtClean="0"/>
-              <a:t>4/3/2020</a:t>
+              <a:t>4/11/2020</a:t>
             </a:fld>
             <a:endParaRPr lang="en-US" dirty="0"/>
           </a:p>
@@ -9130,7 +9126,7 @@
             <a:fld id="{48A87A34-81AB-432B-8DAE-1953F412C126}" type="datetimeFigureOut">
               <a:rPr lang="en-US" smtClean="0"/>
               <a:pPr/>
-              <a:t>4/3/2020</a:t>
+              <a:t>4/11/2020</a:t>
             </a:fld>
             <a:endParaRPr lang="en-US" dirty="0"/>
           </a:p>
@@ -9372,7 +9368,7 @@
           <a:p>
             <a:fld id="{48A87A34-81AB-432B-8DAE-1953F412C126}" type="datetimeFigureOut">
               <a:rPr lang="en-US" dirty="0"/>
-              <a:t>4/3/2020</a:t>
+              <a:t>4/11/2020</a:t>
             </a:fld>
             <a:endParaRPr lang="en-US" dirty="0"/>
           </a:p>
@@ -9746,7 +9742,7 @@
           <a:p>
             <a:fld id="{48A87A34-81AB-432B-8DAE-1953F412C126}" type="datetimeFigureOut">
               <a:rPr lang="en-US" dirty="0"/>
-              <a:t>4/3/2020</a:t>
+              <a:t>4/11/2020</a:t>
             </a:fld>
             <a:endParaRPr lang="en-US" dirty="0"/>
           </a:p>
@@ -9859,7 +9855,7 @@
           <a:p>
             <a:fld id="{48A87A34-81AB-432B-8DAE-1953F412C126}" type="datetimeFigureOut">
               <a:rPr lang="en-US" dirty="0"/>
-              <a:t>4/3/2020</a:t>
+              <a:t>4/11/2020</a:t>
             </a:fld>
             <a:endParaRPr lang="en-US" dirty="0"/>
           </a:p>
@@ -9949,7 +9945,7 @@
           <a:p>
             <a:fld id="{48A87A34-81AB-432B-8DAE-1953F412C126}" type="datetimeFigureOut">
               <a:rPr lang="en-US" dirty="0"/>
-              <a:t>4/3/2020</a:t>
+              <a:t>4/11/2020</a:t>
             </a:fld>
             <a:endParaRPr lang="en-US" dirty="0"/>
           </a:p>
@@ -10193,7 +10189,7 @@
           <a:p>
             <a:fld id="{48A87A34-81AB-432B-8DAE-1953F412C126}" type="datetimeFigureOut">
               <a:rPr lang="en-US" dirty="0"/>
-              <a:t>4/3/2020</a:t>
+              <a:t>4/11/2020</a:t>
             </a:fld>
             <a:endParaRPr lang="en-US" dirty="0"/>
           </a:p>
@@ -10445,7 +10441,7 @@
           <a:p>
             <a:fld id="{48A87A34-81AB-432B-8DAE-1953F412C126}" type="datetimeFigureOut">
               <a:rPr lang="en-US" dirty="0"/>
-              <a:t>4/3/2020</a:t>
+              <a:t>4/11/2020</a:t>
             </a:fld>
             <a:endParaRPr lang="en-US" dirty="0"/>
           </a:p>
@@ -10688,7 +10684,7 @@
             <a:fld id="{48A87A34-81AB-432B-8DAE-1953F412C126}" type="datetimeFigureOut">
               <a:rPr lang="en-US" smtClean="0"/>
               <a:pPr/>
-              <a:t>4/3/2020</a:t>
+              <a:t>4/11/2020</a:t>
             </a:fld>
             <a:endParaRPr lang="en-US" dirty="0"/>
           </a:p>
@@ -11339,7 +11335,7 @@
             <a:fld id="{48A87A34-81AB-432B-8DAE-1953F412C126}" type="datetimeFigureOut">
               <a:rPr lang="en-US" smtClean="0"/>
               <a:pPr/>
-              <a:t>4/3/2020</a:t>
+              <a:t>4/11/2020</a:t>
             </a:fld>
             <a:endParaRPr lang="en-US" dirty="0"/>
           </a:p>
@@ -11631,7 +11627,7 @@
             <a:fld id="{48A87A34-81AB-432B-8DAE-1953F412C126}" type="datetimeFigureOut">
               <a:rPr lang="en-US" smtClean="0"/>
               <a:pPr/>
-              <a:t>4/3/2020</a:t>
+              <a:t>4/11/2020</a:t>
             </a:fld>
             <a:endParaRPr lang="en-US" dirty="0"/>
           </a:p>
@@ -12727,7 +12723,7 @@
           <a:graphicData uri="http://schemas.openxmlformats.org/presentationml/2006/ole">
             <mc:AlternateContent xmlns:mc="http://schemas.openxmlformats.org/markup-compatibility/2006">
               <mc:Choice xmlns:v="urn:schemas-microsoft-com:vml" Requires="v">
-                <p:oleObj spid="_x0000_s17411" name="Equation" r:id="rId3" imgW="1104840" imgH="1130040" progId="Equation.3">
+                <p:oleObj spid="_x0000_s17414" name="Equation" r:id="rId3" imgW="1104840" imgH="1130040" progId="Equation.3">
                   <p:embed/>
                 </p:oleObj>
               </mc:Choice>
@@ -12976,7 +12972,7 @@
           <a:graphicData uri="http://schemas.openxmlformats.org/presentationml/2006/ole">
             <mc:AlternateContent xmlns:mc="http://schemas.openxmlformats.org/markup-compatibility/2006">
               <mc:Choice xmlns:v="urn:schemas-microsoft-com:vml" Requires="v">
-                <p:oleObj spid="_x0000_s12295" name="Equation" r:id="rId3" imgW="1282680" imgH="393480" progId="Equation.3">
+                <p:oleObj spid="_x0000_s12298" name="Equation" r:id="rId3" imgW="1282680" imgH="393480" progId="Equation.3">
                   <p:embed/>
                 </p:oleObj>
               </mc:Choice>
@@ -13175,7 +13171,7 @@
           <a:graphicData uri="http://schemas.openxmlformats.org/presentationml/2006/ole">
             <mc:AlternateContent xmlns:mc="http://schemas.openxmlformats.org/markup-compatibility/2006">
               <mc:Choice xmlns:v="urn:schemas-microsoft-com:vml" Requires="v">
-                <p:oleObj spid="_x0000_s13324" name="Equation" r:id="rId3" imgW="1282680" imgH="393480" progId="Equation.3">
+                <p:oleObj spid="_x0000_s13330" name="Equation" r:id="rId3" imgW="1282680" imgH="393480" progId="Equation.3">
                   <p:embed/>
                 </p:oleObj>
               </mc:Choice>
@@ -13251,7 +13247,7 @@
           <a:graphicData uri="http://schemas.openxmlformats.org/presentationml/2006/ole">
             <mc:AlternateContent xmlns:mc="http://schemas.openxmlformats.org/markup-compatibility/2006">
               <mc:Choice xmlns:v="urn:schemas-microsoft-com:vml" Requires="v">
-                <p:oleObj spid="_x0000_s13325" name="Equation" r:id="rId5" imgW="1587240" imgH="1041120" progId="Equation.3">
+                <p:oleObj spid="_x0000_s13331" name="Equation" r:id="rId5" imgW="1587240" imgH="1041120" progId="Equation.3">
                   <p:embed/>
                 </p:oleObj>
               </mc:Choice>
@@ -13505,7 +13501,7 @@
           <a:graphicData uri="http://schemas.openxmlformats.org/presentationml/2006/ole">
             <mc:AlternateContent xmlns:mc="http://schemas.openxmlformats.org/markup-compatibility/2006">
               <mc:Choice xmlns:v="urn:schemas-microsoft-com:vml" Requires="v">
-                <p:oleObj spid="_x0000_s18435" name="Equation" r:id="rId3" imgW="2336760" imgH="1752480" progId="Equation.3">
+                <p:oleObj spid="_x0000_s18438" name="Equation" r:id="rId3" imgW="2336760" imgH="1752480" progId="Equation.3">
                   <p:embed/>
                 </p:oleObj>
               </mc:Choice>
@@ -13785,16 +13781,7 @@
             </a:pPr>
             <a:r>
               <a:rPr lang="en-US" dirty="0"/>
-              <a:t>At the end of this subtopic, students should be</a:t>
-            </a:r>
-          </a:p>
-          <a:p>
-            <a:pPr>
-              <a:buNone/>
-            </a:pPr>
-            <a:r>
-              <a:rPr lang="en-US" dirty="0"/>
-              <a:t>able to</a:t>
+              <a:t>At the end of this subtopic, students should be able to</a:t>
             </a:r>
             <a:endParaRPr lang="en-MY" dirty="0"/>
           </a:p>
@@ -13807,10 +13794,10 @@
           <a:p>
             <a:r>
               <a:rPr lang="en-MY" dirty="0"/>
-              <a:t>find the n-</a:t>
-            </a:r>
-            <a:r>
-              <a:rPr lang="en-MY" dirty="0" err="1"/>
+              <a:t>find the n</a:t>
+            </a:r>
+            <a:r>
+              <a:rPr lang="en-MY" baseline="30000" dirty="0"/>
               <a:t>th</a:t>
             </a:r>
             <a:r>
@@ -13891,6 +13878,9 @@
           </a:bodyPr>
           <a:lstStyle/>
           <a:p>
+            <a:pPr marL="0" indent="0">
+              <a:buNone/>
+            </a:pPr>
             <a:r>
               <a:rPr lang="en-US" dirty="0"/>
               <a:t>Consider this sequence</a:t>
@@ -13906,12 +13896,12 @@
             </a:r>
           </a:p>
           <a:p>
-            <a:pPr>
+            <a:pPr marL="0" indent="0">
               <a:buNone/>
             </a:pPr>
             <a:r>
               <a:rPr lang="en-MY" dirty="0"/>
-              <a:t>	Each term in the sequence is 3 times the previous term</a:t>
+              <a:t>Each term in the sequence is 3 times the previous term</a:t>
             </a:r>
             <a:r>
               <a:rPr lang="en-US" dirty="0"/>
@@ -13933,17 +13923,13 @@
             </a:pPr>
             <a:r>
               <a:rPr lang="en-US" dirty="0"/>
-              <a:t>	Each term is -2 times the previous term.</a:t>
-            </a:r>
-          </a:p>
-          <a:p>
-            <a:pPr>
+              <a:t>Each term is -2 times the previous term.</a:t>
+            </a:r>
+          </a:p>
+          <a:p>
+            <a:pPr marL="0" indent="0">
               <a:buNone/>
             </a:pPr>
-            <a:r>
-              <a:rPr lang="en-US" dirty="0"/>
-              <a:t>	</a:t>
-            </a:r>
             <a:r>
               <a:rPr lang="en-MY" dirty="0"/>
               <a:t>There is no common difference. Instead there is a common ratio (</a:t>
@@ -14050,6 +14036,9 @@
           <a:bodyPr/>
           <a:lstStyle/>
           <a:p>
+            <a:pPr marL="0" indent="0">
+              <a:buNone/>
+            </a:pPr>
             <a:r>
               <a:rPr lang="en-MY" dirty="0"/>
               <a:t>A geometric progression, or GP, is a sequence where each new term after the first is obtained by multiplying the preceding term by a constant </a:t>
@@ -14116,7 +14105,7 @@
             </a:pPr>
             <a:r>
               <a:rPr lang="en-MY" dirty="0"/>
-              <a:t>	where the n-</a:t>
+              <a:t>where the n-</a:t>
             </a:r>
             <a:r>
               <a:rPr lang="en-MY" dirty="0" err="1"/>
@@ -14144,17 +14133,23 @@
           <p:cNvGraphicFramePr>
             <a:graphicFrameLocks noChangeAspect="1"/>
           </p:cNvGraphicFramePr>
-          <p:nvPr/>
+          <p:nvPr>
+            <p:extLst>
+              <p:ext uri="{D42A27DB-BD31-4B8C-83A1-F6EECF244321}">
+                <p14:modId xmlns:p14="http://schemas.microsoft.com/office/powerpoint/2010/main" val="1260361626"/>
+              </p:ext>
+            </p:extLst>
+          </p:nvPr>
         </p:nvGraphicFramePr>
         <p:xfrm>
-          <a:off x="4343401" y="5302250"/>
+          <a:off x="4826204" y="5134000"/>
           <a:ext cx="1981200" cy="596900"/>
         </p:xfrm>
         <a:graphic>
           <a:graphicData uri="http://schemas.openxmlformats.org/presentationml/2006/ole">
             <mc:AlternateContent xmlns:mc="http://schemas.openxmlformats.org/markup-compatibility/2006">
               <mc:Choice xmlns:v="urn:schemas-microsoft-com:vml" Requires="v">
-                <p:oleObj spid="_x0000_s14342" name="Equation" r:id="rId3" imgW="622080" imgH="241200" progId="Equation.3">
+                <p:oleObj spid="_x0000_s14345" name="Equation" r:id="rId3" imgW="622080" imgH="241200" progId="Equation.3">
                   <p:embed/>
                 </p:oleObj>
               </mc:Choice>
@@ -14184,7 +14179,7 @@
                     </p:blipFill>
                     <p:spPr bwMode="auto">
                       <a:xfrm>
-                        <a:off x="4343401" y="5302250"/>
+                        <a:off x="4826204" y="5134000"/>
                         <a:ext cx="1981200" cy="596900"/>
                       </a:xfrm>
                       <a:prstGeom prst="rect">
@@ -14285,46 +14280,122 @@
         </p:nvSpPr>
         <p:spPr/>
         <p:txBody>
-          <a:bodyPr/>
-          <a:lstStyle/>
-          <a:p>
+          <a:bodyPr>
+            <a:normAutofit/>
+          </a:bodyPr>
+          <a:lstStyle/>
+          <a:p>
+            <a:pPr marL="0" indent="0">
+              <a:buNone/>
+            </a:pPr>
             <a:r>
               <a:rPr lang="en-MY" dirty="0"/>
               <a:t>How many terms are there in the geometric progression   2, 4, 8, . . . , 128 ?</a:t>
             </a:r>
           </a:p>
           <a:p>
-            <a:endParaRPr lang="en-US" dirty="0"/>
-          </a:p>
-          <a:p>
-            <a:endParaRPr lang="en-US" dirty="0"/>
-          </a:p>
-          <a:p>
-            <a:endParaRPr lang="en-US" dirty="0"/>
-          </a:p>
-          <a:p>
-            <a:endParaRPr lang="en-US" dirty="0"/>
-          </a:p>
-          <a:p>
-            <a:endParaRPr lang="en-US" dirty="0"/>
-          </a:p>
-          <a:p>
-            <a:endParaRPr lang="en-US" dirty="0"/>
-          </a:p>
-          <a:p>
-            <a:pPr algn="r"/>
-            <a:r>
-              <a:rPr lang="en-US" dirty="0" err="1"/>
-              <a:t>Ans</a:t>
-            </a:r>
-            <a:r>
-              <a:rPr lang="en-US" dirty="0"/>
-              <a:t>: 7 terms</a:t>
-            </a:r>
-            <a:endParaRPr lang="en-MY" dirty="0"/>
-          </a:p>
-        </p:txBody>
-      </p:sp>
+            <a:pPr marL="0" indent="0">
+              <a:buNone/>
+            </a:pPr>
+            <a:r>
+              <a:rPr lang="en-MY" dirty="0"/>
+              <a:t>Here, we have a = 2, r = 2 and last term T</a:t>
+            </a:r>
+            <a:r>
+              <a:rPr lang="en-MY" baseline="-25000" dirty="0"/>
+              <a:t>n</a:t>
+            </a:r>
+            <a:r>
+              <a:rPr lang="en-MY" dirty="0"/>
+              <a:t> = 128. Using this information, we have the following solution,</a:t>
+            </a:r>
+          </a:p>
+          <a:p>
+            <a:endParaRPr lang="en-US" dirty="0"/>
+          </a:p>
+          <a:p>
+            <a:endParaRPr lang="en-US" dirty="0"/>
+          </a:p>
+          <a:p>
+            <a:endParaRPr lang="en-US" dirty="0"/>
+          </a:p>
+          <a:p>
+            <a:endParaRPr lang="en-US" dirty="0"/>
+          </a:p>
+          <a:p>
+            <a:endParaRPr lang="en-US" dirty="0"/>
+          </a:p>
+          <a:p>
+            <a:pPr marL="0" indent="0">
+              <a:buNone/>
+            </a:pPr>
+            <a:endParaRPr lang="en-US" dirty="0"/>
+          </a:p>
+        </p:txBody>
+      </p:sp>
+      <p:graphicFrame>
+        <p:nvGraphicFramePr>
+          <p:cNvPr id="4" name="Object 3">
+            <a:extLst>
+              <a:ext uri="{FF2B5EF4-FFF2-40B4-BE49-F238E27FC236}">
+                <a16:creationId xmlns:a16="http://schemas.microsoft.com/office/drawing/2014/main" id="{A3DF6D57-6618-4458-AFD6-B0CEDF9EFBD2}"/>
+              </a:ext>
+            </a:extLst>
+          </p:cNvPr>
+          <p:cNvGraphicFramePr>
+            <a:graphicFrameLocks noChangeAspect="1"/>
+          </p:cNvGraphicFramePr>
+          <p:nvPr>
+            <p:extLst>
+              <p:ext uri="{D42A27DB-BD31-4B8C-83A1-F6EECF244321}">
+                <p14:modId xmlns:p14="http://schemas.microsoft.com/office/powerpoint/2010/main" val="2923250519"/>
+              </p:ext>
+            </p:extLst>
+          </p:nvPr>
+        </p:nvGraphicFramePr>
+        <p:xfrm>
+          <a:off x="4804004" y="3232950"/>
+          <a:ext cx="1291996" cy="2795795"/>
+        </p:xfrm>
+        <a:graphic>
+          <a:graphicData uri="http://schemas.openxmlformats.org/presentationml/2006/ole">
+            <mc:AlternateContent xmlns:mc="http://schemas.openxmlformats.org/markup-compatibility/2006">
+              <mc:Choice xmlns:v="urn:schemas-microsoft-com:vml" Requires="v">
+                <p:oleObj spid="_x0000_s19461" name="Equation" r:id="rId3" imgW="774360" imgH="1676160" progId="Equation.3">
+                  <p:embed/>
+                </p:oleObj>
+              </mc:Choice>
+              <mc:Fallback>
+                <p:oleObj name="Equation" r:id="rId3" imgW="774360" imgH="1676160" progId="Equation.3">
+                  <p:embed/>
+                  <p:pic>
+                    <p:nvPicPr>
+                      <p:cNvPr id="0" name=""/>
+                      <p:cNvPicPr/>
+                      <p:nvPr/>
+                    </p:nvPicPr>
+                    <p:blipFill>
+                      <a:blip r:embed="rId4"/>
+                      <a:stretch>
+                        <a:fillRect/>
+                      </a:stretch>
+                    </p:blipFill>
+                    <p:spPr>
+                      <a:xfrm>
+                        <a:off x="4804004" y="3232950"/>
+                        <a:ext cx="1291996" cy="2795795"/>
+                      </a:xfrm>
+                      <a:prstGeom prst="rect">
+                        <a:avLst/>
+                      </a:prstGeom>
+                    </p:spPr>
+                  </p:pic>
+                </p:oleObj>
+              </mc:Fallback>
+            </mc:AlternateContent>
+          </a:graphicData>
+        </a:graphic>
+      </p:graphicFrame>
     </p:spTree>
   </p:cSld>
   <p:clrMapOvr>
@@ -14535,21 +14606,63 @@
           <a:bodyPr/>
           <a:lstStyle/>
           <a:p>
+            <a:pPr marL="0" indent="0">
+              <a:buNone/>
+            </a:pPr>
             <a:r>
               <a:rPr lang="en-MY" dirty="0"/>
-              <a:t>(a) Write down the first five terms of the geometric progression which has first term 1 and common ratio 1 2 . </a:t>
-            </a:r>
-          </a:p>
-          <a:p>
+              <a:t>Exercise</a:t>
+            </a:r>
+          </a:p>
+          <a:p>
+            <a:pPr marL="460375" indent="-460375">
+              <a:buNone/>
+            </a:pPr>
             <a:r>
               <a:rPr lang="en-MY" dirty="0"/>
-              <a:t>(b) Find the 10th and 20th terms of the GP with first term 3 and common ratio 2. </a:t>
-            </a:r>
-          </a:p>
-          <a:p>
+              <a:t>(a) Write down the first five terms of the geometric progression which has first term 1 and common ratio 12 . </a:t>
+            </a:r>
+          </a:p>
+          <a:p>
+            <a:pPr marL="460375" indent="-460375">
+              <a:buNone/>
+            </a:pPr>
             <a:r>
               <a:rPr lang="en-MY" dirty="0"/>
-              <a:t>(c) Find the 7th term of the GP 2, −6, 18, . . .,</a:t>
+              <a:t>(b) Find the 10</a:t>
+            </a:r>
+            <a:r>
+              <a:rPr lang="en-MY" baseline="30000" dirty="0"/>
+              <a:t>th</a:t>
+            </a:r>
+            <a:r>
+              <a:rPr lang="en-MY" dirty="0"/>
+              <a:t> and 20</a:t>
+            </a:r>
+            <a:r>
+              <a:rPr lang="en-MY" baseline="30000" dirty="0"/>
+              <a:t>th</a:t>
+            </a:r>
+            <a:r>
+              <a:rPr lang="en-MY" dirty="0"/>
+              <a:t> terms of the GP with first term 3 and common ratio 2. </a:t>
+            </a:r>
+          </a:p>
+          <a:p>
+            <a:pPr marL="0" indent="0">
+              <a:buNone/>
+            </a:pPr>
+            <a:r>
+              <a:rPr lang="en-MY" dirty="0"/>
+              <a:t>(c) Find the 7</a:t>
+            </a:r>
+            <a:r>
+              <a:rPr lang="en-MY" baseline="30000" dirty="0"/>
+              <a:t>th</a:t>
+            </a:r>
+            <a:r>
+              <a:rPr lang="en-MY" dirty="0"/>
+              <a:t> term of the GP 2, −6, 18, . . .,</a:t>
             </a:r>
           </a:p>
         </p:txBody>
@@ -14626,6 +14739,15 @@
           <a:bodyPr/>
           <a:lstStyle/>
           <a:p>
+            <a:pPr marL="0" indent="0">
+              <a:buNone/>
+            </a:pPr>
+            <a:endParaRPr lang="en-MY" dirty="0"/>
+          </a:p>
+          <a:p>
+            <a:pPr marL="0" indent="0">
+              <a:buNone/>
+            </a:pPr>
             <a:r>
               <a:rPr lang="en-MY" dirty="0"/>
               <a:t>The sum of the terms of a geometric progression gives a geometric series. If the starting value is </a:t>
@@ -14669,22 +14791,28 @@
           <p:cNvGraphicFramePr>
             <a:graphicFrameLocks noChangeAspect="1"/>
           </p:cNvGraphicFramePr>
-          <p:nvPr/>
+          <p:nvPr>
+            <p:extLst>
+              <p:ext uri="{D42A27DB-BD31-4B8C-83A1-F6EECF244321}">
+                <p14:modId xmlns:p14="http://schemas.microsoft.com/office/powerpoint/2010/main" val="2295203020"/>
+              </p:ext>
+            </p:extLst>
+          </p:nvPr>
         </p:nvGraphicFramePr>
         <p:xfrm>
-          <a:off x="3757613" y="3505200"/>
-          <a:ext cx="3763962" cy="1600200"/>
+          <a:off x="3886200" y="3702711"/>
+          <a:ext cx="3505200" cy="1600200"/>
         </p:xfrm>
         <a:graphic>
           <a:graphicData uri="http://schemas.openxmlformats.org/presentationml/2006/ole">
             <mc:AlternateContent xmlns:mc="http://schemas.openxmlformats.org/markup-compatibility/2006">
               <mc:Choice xmlns:v="urn:schemas-microsoft-com:vml" Requires="v">
-                <p:oleObj spid="_x0000_s15366" name="Equation" r:id="rId3" imgW="1663560" imgH="838080" progId="Equation.3">
+                <p:oleObj spid="_x0000_s15370" name="Equation" r:id="rId3" imgW="1549080" imgH="838080" progId="Equation.3">
                   <p:embed/>
                 </p:oleObj>
               </mc:Choice>
               <mc:Fallback>
-                <p:oleObj name="Equation" r:id="rId3" imgW="1663560" imgH="838080" progId="Equation.3">
+                <p:oleObj name="Equation" r:id="rId3" imgW="1549080" imgH="838080" progId="Equation.3">
                   <p:embed/>
                   <p:pic>
                     <p:nvPicPr>
@@ -14703,8 +14831,8 @@
                     </p:blipFill>
                     <p:spPr bwMode="auto">
                       <a:xfrm>
-                        <a:off x="3757613" y="3505200"/>
-                        <a:ext cx="3763962" cy="1600200"/>
+                        <a:off x="3886200" y="3702711"/>
+                        <a:ext cx="3505200" cy="1600200"/>
                       </a:xfrm>
                       <a:prstGeom prst="rect">
                         <a:avLst/>
@@ -14796,9 +14924,14 @@
         </p:nvSpPr>
         <p:spPr/>
         <p:txBody>
-          <a:bodyPr/>
-          <a:lstStyle/>
-          <a:p>
+          <a:bodyPr>
+            <a:normAutofit/>
+          </a:bodyPr>
+          <a:lstStyle/>
+          <a:p>
+            <a:pPr marL="0" indent="0">
+              <a:buNone/>
+            </a:pPr>
             <a:r>
               <a:rPr lang="en-MY" dirty="0"/>
               <a:t>Find the sum of the geometric series </a:t>
@@ -14809,37 +14942,100 @@
             </a:r>
           </a:p>
           <a:p>
-            <a:endParaRPr lang="en-US" dirty="0"/>
-          </a:p>
-          <a:p>
-            <a:endParaRPr lang="en-US" dirty="0"/>
-          </a:p>
-          <a:p>
-            <a:endParaRPr lang="en-US" dirty="0"/>
-          </a:p>
-          <a:p>
-            <a:endParaRPr lang="en-US" dirty="0"/>
-          </a:p>
-          <a:p>
-            <a:endParaRPr lang="en-US" dirty="0"/>
-          </a:p>
-          <a:p>
-            <a:endParaRPr lang="en-US" dirty="0"/>
-          </a:p>
-          <a:p>
-            <a:pPr algn="r"/>
-            <a:r>
-              <a:rPr lang="en-US" dirty="0" err="1"/>
-              <a:t>Ans</a:t>
-            </a:r>
+            <a:pPr marL="0" indent="0">
+              <a:buNone/>
+            </a:pPr>
             <a:r>
               <a:rPr lang="en-US" dirty="0"/>
-              <a:t> : 728</a:t>
-            </a:r>
-            <a:endParaRPr lang="en-MY" dirty="0"/>
-          </a:p>
-        </p:txBody>
-      </p:sp>
+              <a:t>Here we have a = 2, r = 3, and n = 6. Since r &gt; 1, we get</a:t>
+            </a:r>
+          </a:p>
+          <a:p>
+            <a:endParaRPr lang="en-US" dirty="0"/>
+          </a:p>
+          <a:p>
+            <a:endParaRPr lang="en-US" dirty="0"/>
+          </a:p>
+          <a:p>
+            <a:endParaRPr lang="en-US" dirty="0"/>
+          </a:p>
+          <a:p>
+            <a:endParaRPr lang="en-US" dirty="0"/>
+          </a:p>
+          <a:p>
+            <a:endParaRPr lang="en-US" dirty="0"/>
+          </a:p>
+          <a:p>
+            <a:pPr marL="0" indent="0">
+              <a:buNone/>
+            </a:pPr>
+            <a:endParaRPr lang="en-US" dirty="0"/>
+          </a:p>
+        </p:txBody>
+      </p:sp>
+      <p:graphicFrame>
+        <p:nvGraphicFramePr>
+          <p:cNvPr id="4" name="Object 3">
+            <a:extLst>
+              <a:ext uri="{FF2B5EF4-FFF2-40B4-BE49-F238E27FC236}">
+                <a16:creationId xmlns:a16="http://schemas.microsoft.com/office/drawing/2014/main" id="{8A0779E2-54F3-4AEB-BD64-DEE0FFC83037}"/>
+              </a:ext>
+            </a:extLst>
+          </p:cNvPr>
+          <p:cNvGraphicFramePr>
+            <a:graphicFrameLocks noChangeAspect="1"/>
+          </p:cNvGraphicFramePr>
+          <p:nvPr>
+            <p:extLst>
+              <p:ext uri="{D42A27DB-BD31-4B8C-83A1-F6EECF244321}">
+                <p14:modId xmlns:p14="http://schemas.microsoft.com/office/powerpoint/2010/main" val="825886830"/>
+              </p:ext>
+            </p:extLst>
+          </p:nvPr>
+        </p:nvGraphicFramePr>
+        <p:xfrm>
+          <a:off x="4348428" y="3429000"/>
+          <a:ext cx="1957273" cy="2666430"/>
+        </p:xfrm>
+        <a:graphic>
+          <a:graphicData uri="http://schemas.openxmlformats.org/presentationml/2006/ole">
+            <mc:AlternateContent xmlns:mc="http://schemas.openxmlformats.org/markup-compatibility/2006">
+              <mc:Choice xmlns:v="urn:schemas-microsoft-com:vml" Requires="v">
+                <p:oleObj spid="_x0000_s20484" name="Equation" r:id="rId3" imgW="876240" imgH="1193760" progId="Equation.3">
+                  <p:embed/>
+                </p:oleObj>
+              </mc:Choice>
+              <mc:Fallback>
+                <p:oleObj name="Equation" r:id="rId3" imgW="876240" imgH="1193760" progId="Equation.3">
+                  <p:embed/>
+                  <p:pic>
+                    <p:nvPicPr>
+                      <p:cNvPr id="0" name=""/>
+                      <p:cNvPicPr/>
+                      <p:nvPr/>
+                    </p:nvPicPr>
+                    <p:blipFill>
+                      <a:blip r:embed="rId4"/>
+                      <a:stretch>
+                        <a:fillRect/>
+                      </a:stretch>
+                    </p:blipFill>
+                    <p:spPr>
+                      <a:xfrm>
+                        <a:off x="4348428" y="3429000"/>
+                        <a:ext cx="1957273" cy="2666430"/>
+                      </a:xfrm>
+                      <a:prstGeom prst="rect">
+                        <a:avLst/>
+                      </a:prstGeom>
+                    </p:spPr>
+                  </p:pic>
+                </p:oleObj>
+              </mc:Fallback>
+            </mc:AlternateContent>
+          </a:graphicData>
+        </a:graphic>
+      </p:graphicFrame>
     </p:spTree>
   </p:cSld>
   <p:clrMapOvr>
@@ -14909,46 +15105,117 @@
         </p:nvSpPr>
         <p:spPr/>
         <p:txBody>
-          <a:bodyPr/>
-          <a:lstStyle/>
-          <a:p>
+          <a:bodyPr>
+            <a:normAutofit/>
+          </a:bodyPr>
+          <a:lstStyle/>
+          <a:p>
+            <a:pPr marL="0" indent="0">
+              <a:buNone/>
+            </a:pPr>
             <a:r>
               <a:rPr lang="en-MY" dirty="0"/>
               <a:t>Find the sum of the geometric series 8, -4, 2, -1, … where there are 5 terms in the series.</a:t>
             </a:r>
           </a:p>
           <a:p>
-            <a:endParaRPr lang="en-US" dirty="0"/>
-          </a:p>
-          <a:p>
-            <a:endParaRPr lang="en-US" dirty="0"/>
-          </a:p>
-          <a:p>
-            <a:endParaRPr lang="en-US" dirty="0"/>
-          </a:p>
-          <a:p>
-            <a:endParaRPr lang="en-US" dirty="0"/>
-          </a:p>
-          <a:p>
-            <a:endParaRPr lang="en-US" dirty="0"/>
-          </a:p>
-          <a:p>
-            <a:endParaRPr lang="en-US" dirty="0"/>
-          </a:p>
-          <a:p>
-            <a:pPr algn="r"/>
-            <a:r>
-              <a:rPr lang="en-US" dirty="0" err="1"/>
-              <a:t>Ans</a:t>
-            </a:r>
-            <a:r>
-              <a:rPr lang="en-US" dirty="0"/>
-              <a:t>: 11/2</a:t>
-            </a:r>
+            <a:pPr marL="0" indent="0">
+              <a:buNone/>
+            </a:pPr>
+            <a:r>
+              <a:rPr lang="en-MY" dirty="0"/>
+              <a:t>Here we have a = 8, r = - 1/2 , and n = 5. Since r &lt; 1, we have</a:t>
+            </a:r>
+          </a:p>
+          <a:p>
+            <a:pPr marL="0" indent="0">
+              <a:buNone/>
+            </a:pPr>
             <a:endParaRPr lang="en-MY" dirty="0"/>
           </a:p>
-        </p:txBody>
-      </p:sp>
+          <a:p>
+            <a:endParaRPr lang="en-US" dirty="0"/>
+          </a:p>
+          <a:p>
+            <a:endParaRPr lang="en-US" dirty="0"/>
+          </a:p>
+          <a:p>
+            <a:endParaRPr lang="en-US" dirty="0"/>
+          </a:p>
+          <a:p>
+            <a:endParaRPr lang="en-US" dirty="0"/>
+          </a:p>
+          <a:p>
+            <a:endParaRPr lang="en-US" dirty="0"/>
+          </a:p>
+          <a:p>
+            <a:endParaRPr lang="en-US" dirty="0"/>
+          </a:p>
+        </p:txBody>
+      </p:sp>
+      <p:graphicFrame>
+        <p:nvGraphicFramePr>
+          <p:cNvPr id="4" name="Object 3">
+            <a:extLst>
+              <a:ext uri="{FF2B5EF4-FFF2-40B4-BE49-F238E27FC236}">
+                <a16:creationId xmlns:a16="http://schemas.microsoft.com/office/drawing/2014/main" id="{35E79BB7-7337-4CD3-B97A-10A1AB8745B6}"/>
+              </a:ext>
+            </a:extLst>
+          </p:cNvPr>
+          <p:cNvGraphicFramePr>
+            <a:graphicFrameLocks noChangeAspect="1"/>
+          </p:cNvGraphicFramePr>
+          <p:nvPr>
+            <p:extLst>
+              <p:ext uri="{D42A27DB-BD31-4B8C-83A1-F6EECF244321}">
+                <p14:modId xmlns:p14="http://schemas.microsoft.com/office/powerpoint/2010/main" val="3539983332"/>
+              </p:ext>
+            </p:extLst>
+          </p:nvPr>
+        </p:nvGraphicFramePr>
+        <p:xfrm>
+          <a:off x="4493056" y="3338569"/>
+          <a:ext cx="1885797" cy="3017275"/>
+        </p:xfrm>
+        <a:graphic>
+          <a:graphicData uri="http://schemas.openxmlformats.org/presentationml/2006/ole">
+            <mc:AlternateContent xmlns:mc="http://schemas.openxmlformats.org/markup-compatibility/2006">
+              <mc:Choice xmlns:v="urn:schemas-microsoft-com:vml" Requires="v">
+                <p:oleObj spid="_x0000_s21507" name="Equation" r:id="rId3" imgW="1143000" imgH="1828800" progId="Equation.3">
+                  <p:embed/>
+                </p:oleObj>
+              </mc:Choice>
+              <mc:Fallback>
+                <p:oleObj name="Equation" r:id="rId3" imgW="1143000" imgH="1828800" progId="Equation.3">
+                  <p:embed/>
+                  <p:pic>
+                    <p:nvPicPr>
+                      <p:cNvPr id="0" name=""/>
+                      <p:cNvPicPr/>
+                      <p:nvPr/>
+                    </p:nvPicPr>
+                    <p:blipFill>
+                      <a:blip r:embed="rId4"/>
+                      <a:stretch>
+                        <a:fillRect/>
+                      </a:stretch>
+                    </p:blipFill>
+                    <p:spPr>
+                      <a:xfrm>
+                        <a:off x="4493056" y="3338569"/>
+                        <a:ext cx="1885797" cy="3017275"/>
+                      </a:xfrm>
+                      <a:prstGeom prst="rect">
+                        <a:avLst/>
+                      </a:prstGeom>
+                    </p:spPr>
+                  </p:pic>
+                </p:oleObj>
+              </mc:Fallback>
+            </mc:AlternateContent>
+          </a:graphicData>
+        </a:graphic>
+      </p:graphicFrame>
     </p:spTree>
   </p:cSld>
   <p:clrMapOvr>
@@ -15016,36 +15283,136 @@
             <p:ph idx="1"/>
           </p:nvPr>
         </p:nvSpPr>
-        <p:spPr/>
+        <p:spPr>
+          <a:xfrm>
+            <a:off x="685800" y="2194560"/>
+            <a:ext cx="5678424" cy="4024125"/>
+          </a:xfrm>
+        </p:spPr>
         <p:txBody>
           <a:bodyPr/>
           <a:lstStyle/>
           <a:p>
+            <a:pPr marL="0" indent="0">
+              <a:buNone/>
+            </a:pPr>
             <a:r>
               <a:rPr lang="en-MY" dirty="0"/>
               <a:t>How many terms in the geometric progression</a:t>
             </a:r>
           </a:p>
           <a:p>
+            <a:pPr algn="ctr">
+              <a:buNone/>
+            </a:pPr>
+            <a:r>
+              <a:rPr lang="en-MY" dirty="0"/>
+              <a:t>1, 1.1, 1.21, 1.331, . . .</a:t>
+            </a:r>
+          </a:p>
+          <a:p>
+            <a:pPr marL="0" indent="0">
+              <a:buNone/>
+            </a:pPr>
+            <a:r>
+              <a:rPr lang="en-MY" dirty="0"/>
+              <a:t>will be needed so that the sum of the first n terms is greater than 20?</a:t>
+            </a:r>
+          </a:p>
+          <a:p>
+            <a:pPr marL="0" indent="0">
+              <a:buNone/>
+            </a:pPr>
+            <a:endParaRPr lang="en-MY" dirty="0"/>
+          </a:p>
+          <a:p>
+            <a:pPr marL="0" indent="0">
+              <a:buNone/>
+            </a:pPr>
+            <a:r>
+              <a:rPr lang="en-MY" dirty="0"/>
+              <a:t>Here we have a = 1, r = 1.1, and S</a:t>
+            </a:r>
+            <a:r>
+              <a:rPr lang="en-MY" baseline="-25000" dirty="0"/>
+              <a:t>n</a:t>
+            </a:r>
+            <a:r>
+              <a:rPr lang="en-MY" dirty="0"/>
+              <a:t> &gt; 20. Thus, using the sum formula for r &gt; 1, we have </a:t>
+            </a:r>
+          </a:p>
+          <a:p>
             <a:pPr>
               <a:buNone/>
             </a:pPr>
-            <a:r>
-              <a:rPr lang="en-MY" dirty="0"/>
-              <a:t>			1, 1.1, 1.21, 1.331, . . .</a:t>
-            </a:r>
-          </a:p>
-          <a:p>
-            <a:pPr>
-              <a:buNone/>
-            </a:pPr>
-            <a:r>
-              <a:rPr lang="en-MY" dirty="0"/>
-              <a:t>	will be needed so that the sum of the first n terms is greater than 20?</a:t>
-            </a:r>
-          </a:p>
-        </p:txBody>
-      </p:sp>
+            <a:endParaRPr lang="en-MY" dirty="0"/>
+          </a:p>
+        </p:txBody>
+      </p:sp>
+      <p:graphicFrame>
+        <p:nvGraphicFramePr>
+          <p:cNvPr id="4" name="Object 3">
+            <a:extLst>
+              <a:ext uri="{FF2B5EF4-FFF2-40B4-BE49-F238E27FC236}">
+                <a16:creationId xmlns:a16="http://schemas.microsoft.com/office/drawing/2014/main" id="{D44016CE-DC1B-47E7-9640-79F63DD941DC}"/>
+              </a:ext>
+            </a:extLst>
+          </p:cNvPr>
+          <p:cNvGraphicFramePr>
+            <a:graphicFrameLocks noChangeAspect="1"/>
+          </p:cNvGraphicFramePr>
+          <p:nvPr>
+            <p:extLst>
+              <p:ext uri="{D42A27DB-BD31-4B8C-83A1-F6EECF244321}">
+                <p14:modId xmlns:p14="http://schemas.microsoft.com/office/powerpoint/2010/main" val="1588831538"/>
+              </p:ext>
+            </p:extLst>
+          </p:nvPr>
+        </p:nvGraphicFramePr>
+        <p:xfrm>
+          <a:off x="7753145" y="2191758"/>
+          <a:ext cx="2012645" cy="3982919"/>
+        </p:xfrm>
+        <a:graphic>
+          <a:graphicData uri="http://schemas.openxmlformats.org/presentationml/2006/ole">
+            <mc:AlternateContent xmlns:mc="http://schemas.openxmlformats.org/markup-compatibility/2006">
+              <mc:Choice xmlns:v="urn:schemas-microsoft-com:vml" Requires="v">
+                <p:oleObj spid="_x0000_s22532" name="Equation" r:id="rId3" imgW="1206360" imgH="2387520" progId="Equation.3">
+                  <p:embed/>
+                </p:oleObj>
+              </mc:Choice>
+              <mc:Fallback>
+                <p:oleObj name="Equation" r:id="rId3" imgW="1206360" imgH="2387520" progId="Equation.3">
+                  <p:embed/>
+                  <p:pic>
+                    <p:nvPicPr>
+                      <p:cNvPr id="0" name=""/>
+                      <p:cNvPicPr/>
+                      <p:nvPr/>
+                    </p:nvPicPr>
+                    <p:blipFill>
+                      <a:blip r:embed="rId4"/>
+                      <a:stretch>
+                        <a:fillRect/>
+                      </a:stretch>
+                    </p:blipFill>
+                    <p:spPr>
+                      <a:xfrm>
+                        <a:off x="7753145" y="2191758"/>
+                        <a:ext cx="2012645" cy="3982919"/>
+                      </a:xfrm>
+                      <a:prstGeom prst="rect">
+                        <a:avLst/>
+                      </a:prstGeom>
+                    </p:spPr>
+                  </p:pic>
+                </p:oleObj>
+              </mc:Fallback>
+            </mc:AlternateContent>
+          </a:graphicData>
+        </a:graphic>
+      </p:graphicFrame>
     </p:spTree>
   </p:cSld>
   <p:clrMapOvr>
@@ -15120,24 +15487,45 @@
           </a:bodyPr>
           <a:lstStyle/>
           <a:p>
+            <a:pPr marL="512763" indent="-512763">
+              <a:buNone/>
+            </a:pPr>
+            <a:r>
+              <a:rPr lang="en-MY" dirty="0"/>
+              <a:t>Exercises (Try these yourselves)</a:t>
+            </a:r>
+          </a:p>
+          <a:p>
+            <a:pPr marL="512763" indent="-512763">
+              <a:buNone/>
+            </a:pPr>
             <a:r>
               <a:rPr lang="en-MY" dirty="0"/>
               <a:t>(a) Find the sum of the first five terms of the GP with first term 3 and common ratio 2.</a:t>
             </a:r>
           </a:p>
           <a:p>
+            <a:pPr marL="512763" indent="-512763">
+              <a:buNone/>
+            </a:pPr>
             <a:r>
               <a:rPr lang="en-MY" dirty="0"/>
               <a:t>(b) Find the sum of the first 20 terms of the GP with first term 3 and common ratio 1.5.</a:t>
             </a:r>
           </a:p>
           <a:p>
+            <a:pPr marL="512763" indent="-512763">
+              <a:buNone/>
+            </a:pPr>
             <a:r>
               <a:rPr lang="en-MY" dirty="0"/>
               <a:t>(c) The sum of the first 3 terms of a geometric series is 37/8 . The sum of the first six terms is 3367/512 . Find the first term and common ratio.</a:t>
             </a:r>
           </a:p>
           <a:p>
+            <a:pPr marL="512763" indent="-512763">
+              <a:buNone/>
+            </a:pPr>
             <a:r>
               <a:rPr lang="en-MY" dirty="0"/>
               <a:t>(d) How many terms in the GP 4, 3.6, 3.24, . . . are needed so that the sum exceeds 35?</a:t>
@@ -15182,73 +15570,128 @@
         </p:nvSpPr>
         <p:spPr/>
         <p:txBody>
+          <a:bodyPr>
+            <a:normAutofit fontScale="90000"/>
+          </a:bodyPr>
+          <a:lstStyle/>
+          <a:p>
+            <a:r>
+              <a:rPr lang="en-US" dirty="0"/>
+              <a:t>GEOMETRIC SEQUENCE</a:t>
+            </a:r>
+            <a:br>
+              <a:rPr lang="en-US" dirty="0"/>
+            </a:br>
+            <a:r>
+              <a:rPr lang="en-US" dirty="0"/>
+              <a:t>(application of geometric sequence)</a:t>
+            </a:r>
+            <a:endParaRPr lang="en-MY" dirty="0"/>
+          </a:p>
+        </p:txBody>
+      </p:sp>
+      <p:sp>
+        <p:nvSpPr>
+          <p:cNvPr id="3" name="Content Placeholder 2"/>
+          <p:cNvSpPr>
+            <a:spLocks noGrp="1"/>
+          </p:cNvSpPr>
+          <p:nvPr>
+            <p:ph idx="1"/>
+          </p:nvPr>
+        </p:nvSpPr>
+        <p:spPr/>
+        <p:txBody>
           <a:bodyPr/>
           <a:lstStyle/>
           <a:p>
-            <a:endParaRPr lang="en-MY"/>
-          </a:p>
-        </p:txBody>
-      </p:sp>
-      <p:sp>
-        <p:nvSpPr>
-          <p:cNvPr id="3" name="Content Placeholder 2"/>
-          <p:cNvSpPr>
-            <a:spLocks noGrp="1"/>
-          </p:cNvSpPr>
-          <p:nvPr>
-            <p:ph idx="1"/>
-          </p:nvPr>
-        </p:nvSpPr>
-        <p:spPr/>
-        <p:txBody>
-          <a:bodyPr/>
-          <a:lstStyle/>
-          <a:p>
+            <a:pPr marL="0" indent="0">
+              <a:buNone/>
+            </a:pPr>
             <a:r>
               <a:rPr lang="en-MY" dirty="0"/>
-              <a:t>(a) 1, 1</a:t>
-            </a:r>
-          </a:p>
-          <a:p>
+              <a:t>When </a:t>
+            </a:r>
+            <a:r>
+              <a:rPr lang="en-MY" dirty="0" err="1"/>
+              <a:t>Muaz</a:t>
+            </a:r>
             <a:r>
               <a:rPr lang="en-MY" dirty="0"/>
-              <a:t>2 , 1</a:t>
-            </a:r>
-          </a:p>
-          <a:p>
+              <a:t> started working in 2002, his starting salary was RM1,800. Every year his salary increases by 3% based on the previous year's salary. What is his salary in year 2011? </a:t>
+            </a:r>
+            <a:r>
+              <a:rPr lang="en-MY" i="1" dirty="0"/>
+              <a:t>(</a:t>
+            </a:r>
+            <a:r>
+              <a:rPr lang="en-US" i="1" dirty="0"/>
+              <a:t>Hint given: if % included, how to determine r? if Increase, then r =1 + %, otherwise if decrease, r = 1 - %)</a:t>
+            </a:r>
+          </a:p>
+          <a:p>
+            <a:pPr marL="0" indent="0">
+              <a:buNone/>
+            </a:pPr>
+            <a:endParaRPr lang="en-MY" dirty="0"/>
+          </a:p>
+          <a:p>
+            <a:pPr marL="0" indent="0">
+              <a:buNone/>
+            </a:pPr>
             <a:r>
               <a:rPr lang="en-MY" dirty="0"/>
-              <a:t>4 , 1</a:t>
-            </a:r>
-          </a:p>
-          <a:p>
+              <a:t>Here we have a = 1,800, r = 1 + 3% = 1.03, and n = 2011 – 2002 = 8.</a:t>
+            </a:r>
+          </a:p>
+          <a:p>
+            <a:pPr marL="0" indent="0">
+              <a:buNone/>
+            </a:pPr>
             <a:r>
               <a:rPr lang="en-MY" dirty="0"/>
-              <a:t>8 , 1</a:t>
-            </a:r>
-          </a:p>
-          <a:p>
-            <a:r>
-              <a:rPr lang="pl-PL" dirty="0"/>
-              <a:t>16 (b) 1536, 1,572,864 (c) 1458</a:t>
-            </a:r>
-          </a:p>
-          <a:p>
+              <a:t>So,</a:t>
+            </a:r>
+          </a:p>
+          <a:p>
+            <a:pPr marL="0" indent="0" algn="ctr">
+              <a:buNone/>
+            </a:pPr>
             <a:r>
               <a:rPr lang="en-MY" dirty="0"/>
-              <a:t>6.</a:t>
-            </a:r>
-          </a:p>
-          <a:p>
-            <a:r>
-              <a:rPr lang="pt-BR" dirty="0"/>
-              <a:t>(a) 93 (b) 19,946 (c) 2, 3</a:t>
-            </a:r>
-          </a:p>
-          <a:p>
+              <a:t>T</a:t>
+            </a:r>
+            <a:r>
+              <a:rPr lang="en-MY" baseline="-25000" dirty="0"/>
+              <a:t>8</a:t>
+            </a:r>
             <a:r>
               <a:rPr lang="en-MY" dirty="0"/>
-              <a:t>4 (d) 20 terms</a:t>
+              <a:t> = </a:t>
+            </a:r>
+            <a:r>
+              <a:rPr lang="en-MY" dirty="0" err="1"/>
+              <a:t>ar</a:t>
+            </a:r>
+            <a:r>
+              <a:rPr lang="en-MY" baseline="30000" dirty="0"/>
+              <a:t>(8 - 1) </a:t>
+            </a:r>
+            <a:r>
+              <a:rPr lang="en-MY" dirty="0"/>
+              <a:t>= 1800(1.03)</a:t>
+            </a:r>
+            <a:r>
+              <a:rPr lang="en-MY" baseline="30000" dirty="0"/>
+              <a:t>7</a:t>
+            </a:r>
+            <a:r>
+              <a:rPr lang="en-MY" dirty="0"/>
+              <a:t> = </a:t>
+            </a:r>
+            <a:r>
+              <a:rPr lang="en-MY" b="1" dirty="0"/>
+              <a:t>RM 2,213.77</a:t>
             </a:r>
           </a:p>
         </p:txBody>
@@ -15290,200 +15733,6 @@
         </p:nvSpPr>
         <p:spPr/>
         <p:txBody>
-          <a:bodyPr>
-            <a:normAutofit fontScale="90000"/>
-          </a:bodyPr>
-          <a:lstStyle/>
-          <a:p>
-            <a:r>
-              <a:rPr lang="en-US" dirty="0"/>
-              <a:t>GEOMETRIC SEQUENCE</a:t>
-            </a:r>
-            <a:br>
-              <a:rPr lang="en-US" dirty="0"/>
-            </a:br>
-            <a:r>
-              <a:rPr lang="en-US" dirty="0"/>
-              <a:t>(application of geometric sequence)</a:t>
-            </a:r>
-            <a:endParaRPr lang="en-MY" dirty="0"/>
-          </a:p>
-        </p:txBody>
-      </p:sp>
-      <p:sp>
-        <p:nvSpPr>
-          <p:cNvPr id="3" name="Content Placeholder 2"/>
-          <p:cNvSpPr>
-            <a:spLocks noGrp="1"/>
-          </p:cNvSpPr>
-          <p:nvPr>
-            <p:ph idx="1"/>
-          </p:nvPr>
-        </p:nvSpPr>
-        <p:spPr/>
-        <p:txBody>
-          <a:bodyPr/>
-          <a:lstStyle/>
-          <a:p>
-            <a:r>
-              <a:rPr lang="en-US" dirty="0"/>
-              <a:t>Hint given: </a:t>
-            </a:r>
-            <a:r>
-              <a:rPr lang="en-US"/>
-              <a:t>% included </a:t>
-            </a:r>
-            <a:endParaRPr lang="en-US" dirty="0"/>
-          </a:p>
-          <a:p>
-            <a:r>
-              <a:rPr lang="en-US" dirty="0"/>
-              <a:t>How to determine r?</a:t>
-            </a:r>
-          </a:p>
-          <a:p>
-            <a:pPr lvl="1"/>
-            <a:r>
-              <a:rPr lang="en-US" dirty="0"/>
-              <a:t>Increase: 1+%</a:t>
-            </a:r>
-          </a:p>
-          <a:p>
-            <a:pPr lvl="1"/>
-            <a:r>
-              <a:rPr lang="en-US" dirty="0"/>
-              <a:t>Decrease: 1-%</a:t>
-            </a:r>
-          </a:p>
-          <a:p>
-            <a:endParaRPr lang="en-MY" dirty="0"/>
-          </a:p>
-        </p:txBody>
-      </p:sp>
-    </p:spTree>
-  </p:cSld>
-  <p:clrMapOvr>
-    <a:masterClrMapping/>
-  </p:clrMapOvr>
-</p:sld>
-</file>
-
-<file path=ppt/slides/slide28.xml><?xml version="1.0" encoding="utf-8"?>
-<p:sld xmlns:a="http://schemas.openxmlformats.org/drawingml/2006/main" xmlns:r="http://schemas.openxmlformats.org/officeDocument/2006/relationships" xmlns:p="http://schemas.openxmlformats.org/presentationml/2006/main">
-  <p:cSld>
-    <p:spTree>
-      <p:nvGrpSpPr>
-        <p:cNvPr id="1" name=""/>
-        <p:cNvGrpSpPr/>
-        <p:nvPr/>
-      </p:nvGrpSpPr>
-      <p:grpSpPr>
-        <a:xfrm>
-          <a:off x="0" y="0"/>
-          <a:ext cx="0" cy="0"/>
-          <a:chOff x="0" y="0"/>
-          <a:chExt cx="0" cy="0"/>
-        </a:xfrm>
-      </p:grpSpPr>
-      <p:sp>
-        <p:nvSpPr>
-          <p:cNvPr id="2" name="Title 1"/>
-          <p:cNvSpPr>
-            <a:spLocks noGrp="1"/>
-          </p:cNvSpPr>
-          <p:nvPr>
-            <p:ph type="title"/>
-          </p:nvPr>
-        </p:nvSpPr>
-        <p:spPr/>
-        <p:txBody>
-          <a:bodyPr>
-            <a:normAutofit fontScale="90000"/>
-          </a:bodyPr>
-          <a:lstStyle/>
-          <a:p>
-            <a:r>
-              <a:rPr lang="en-US" dirty="0"/>
-              <a:t>GEOMETRIC SEQUENCE</a:t>
-            </a:r>
-            <a:br>
-              <a:rPr lang="en-US" dirty="0"/>
-            </a:br>
-            <a:r>
-              <a:rPr lang="en-US" dirty="0"/>
-              <a:t>(application of geometric sequence)</a:t>
-            </a:r>
-            <a:endParaRPr lang="en-MY" dirty="0"/>
-          </a:p>
-        </p:txBody>
-      </p:sp>
-      <p:sp>
-        <p:nvSpPr>
-          <p:cNvPr id="3" name="Content Placeholder 2"/>
-          <p:cNvSpPr>
-            <a:spLocks noGrp="1"/>
-          </p:cNvSpPr>
-          <p:nvPr>
-            <p:ph idx="1"/>
-          </p:nvPr>
-        </p:nvSpPr>
-        <p:spPr/>
-        <p:txBody>
-          <a:bodyPr/>
-          <a:lstStyle/>
-          <a:p>
-            <a:r>
-              <a:rPr lang="en-MY" dirty="0"/>
-              <a:t>When </a:t>
-            </a:r>
-            <a:r>
-              <a:rPr lang="en-MY" dirty="0" err="1"/>
-              <a:t>Muaz</a:t>
-            </a:r>
-            <a:r>
-              <a:rPr lang="en-MY" dirty="0"/>
-              <a:t> started working in 2002, his starting salary was RM1,800. Every year his salary increases by 3% based on the previous year's salary. What is his salary in year 2011?</a:t>
-            </a:r>
-          </a:p>
-        </p:txBody>
-      </p:sp>
-    </p:spTree>
-  </p:cSld>
-  <p:clrMapOvr>
-    <a:masterClrMapping/>
-  </p:clrMapOvr>
-</p:sld>
-</file>
-
-<file path=ppt/slides/slide29.xml><?xml version="1.0" encoding="utf-8"?>
-<p:sld xmlns:a="http://schemas.openxmlformats.org/drawingml/2006/main" xmlns:r="http://schemas.openxmlformats.org/officeDocument/2006/relationships" xmlns:p="http://schemas.openxmlformats.org/presentationml/2006/main">
-  <p:cSld>
-    <p:spTree>
-      <p:nvGrpSpPr>
-        <p:cNvPr id="1" name=""/>
-        <p:cNvGrpSpPr/>
-        <p:nvPr/>
-      </p:nvGrpSpPr>
-      <p:grpSpPr>
-        <a:xfrm>
-          <a:off x="0" y="0"/>
-          <a:ext cx="0" cy="0"/>
-          <a:chOff x="0" y="0"/>
-          <a:chExt cx="0" cy="0"/>
-        </a:xfrm>
-      </p:grpSpPr>
-      <p:sp>
-        <p:nvSpPr>
-          <p:cNvPr id="2" name="Title 1"/>
-          <p:cNvSpPr>
-            <a:spLocks noGrp="1"/>
-          </p:cNvSpPr>
-          <p:nvPr>
-            <p:ph type="title"/>
-          </p:nvPr>
-        </p:nvSpPr>
-        <p:spPr/>
-        <p:txBody>
           <a:bodyPr/>
           <a:lstStyle/>
           <a:p>
@@ -15505,24 +15754,25 @@
             <p:ph idx="1"/>
           </p:nvPr>
         </p:nvSpPr>
-        <p:spPr/>
-        <p:txBody>
-          <a:bodyPr/>
+        <p:spPr>
+          <a:xfrm>
+            <a:off x="685800" y="1923898"/>
+            <a:ext cx="10820400" cy="4396435"/>
+          </a:xfrm>
+        </p:spPr>
+        <p:txBody>
+          <a:bodyPr>
+            <a:normAutofit fontScale="62500" lnSpcReduction="20000"/>
+          </a:bodyPr>
           <a:lstStyle/>
           <a:p>
             <a:pPr>
               <a:buNone/>
             </a:pPr>
             <a:r>
-              <a:rPr lang="en-US" dirty="0"/>
-              <a:t>MAC2015</a:t>
-            </a:r>
-          </a:p>
-          <a:p>
-            <a:pPr>
-              <a:buNone/>
-            </a:pPr>
-            <a:endParaRPr lang="en-US" dirty="0"/>
+              <a:rPr lang="en-US" b="1" dirty="0"/>
+              <a:t>MAC 2015</a:t>
+            </a:r>
           </a:p>
           <a:p>
             <a:pPr>
@@ -15550,13 +15800,7 @@
             </a:r>
           </a:p>
           <a:p>
-            <a:pPr>
-              <a:buNone/>
-            </a:pPr>
-            <a:endParaRPr lang="en-US" dirty="0"/>
-          </a:p>
-          <a:p>
-            <a:pPr marL="514350" indent="-514350">
+            <a:pPr marL="285750" indent="-285750">
               <a:buAutoNum type="alphaLcParenR"/>
             </a:pPr>
             <a:r>
@@ -15565,12 +15809,125 @@
             </a:r>
           </a:p>
           <a:p>
-            <a:pPr marL="514350" indent="-514350">
+            <a:pPr marL="285750" indent="-285750">
               <a:buAutoNum type="alphaLcParenR"/>
             </a:pPr>
             <a:r>
               <a:rPr lang="en-US" dirty="0"/>
               <a:t>the sum of the first five terms.</a:t>
+            </a:r>
+          </a:p>
+          <a:p>
+            <a:pPr marL="0" indent="0">
+              <a:buNone/>
+            </a:pPr>
+            <a:endParaRPr lang="en-US" sz="1500" dirty="0"/>
+          </a:p>
+          <a:p>
+            <a:pPr>
+              <a:buNone/>
+            </a:pPr>
+            <a:r>
+              <a:rPr lang="en-US" b="1" dirty="0"/>
+              <a:t>SEPT 2014</a:t>
+            </a:r>
+          </a:p>
+          <a:p>
+            <a:pPr>
+              <a:buNone/>
+            </a:pPr>
+            <a:r>
+              <a:rPr lang="en-MY" dirty="0"/>
+              <a:t>a) Given a sequence: 10, 30, 90, 270, 810, 2430....., find the sum of the first 10 terms</a:t>
+            </a:r>
+          </a:p>
+          <a:p>
+            <a:pPr>
+              <a:buNone/>
+            </a:pPr>
+            <a:r>
+              <a:rPr lang="en-US" dirty="0"/>
+              <a:t>b) </a:t>
+            </a:r>
+            <a:r>
+              <a:rPr lang="en-MY" dirty="0"/>
+              <a:t>The fourth term of an arithmetic sequence is less than the fifth term by 3. The seventh term is three times the fifth term. Find </a:t>
+            </a:r>
+          </a:p>
+          <a:p>
+            <a:pPr>
+              <a:buNone/>
+            </a:pPr>
+            <a:r>
+              <a:rPr lang="en-US" dirty="0"/>
+              <a:t>	</a:t>
+            </a:r>
+            <a:r>
+              <a:rPr lang="en-US" dirty="0" err="1"/>
+              <a:t>i</a:t>
+            </a:r>
+            <a:r>
+              <a:rPr lang="en-US" dirty="0"/>
+              <a:t>) t</a:t>
+            </a:r>
+            <a:r>
+              <a:rPr lang="en-MY" dirty="0"/>
+              <a:t>he common difference and the first term</a:t>
+            </a:r>
+          </a:p>
+          <a:p>
+            <a:pPr>
+              <a:buNone/>
+            </a:pPr>
+            <a:r>
+              <a:rPr lang="en-US" dirty="0"/>
+              <a:t>	ii) </a:t>
+            </a:r>
+            <a:r>
+              <a:rPr lang="en-MY" dirty="0"/>
+              <a:t>the sum of the first 12 terms</a:t>
+            </a:r>
+          </a:p>
+          <a:p>
+            <a:pPr>
+              <a:buNone/>
+            </a:pPr>
+            <a:endParaRPr lang="en-US" sz="1500" dirty="0"/>
+          </a:p>
+          <a:p>
+            <a:pPr>
+              <a:buNone/>
+            </a:pPr>
+            <a:r>
+              <a:rPr lang="en-US" b="1" dirty="0"/>
+              <a:t>MAC 2014</a:t>
+            </a:r>
+          </a:p>
+          <a:p>
+            <a:pPr marL="227013" indent="-227013">
+              <a:buAutoNum type="alphaLcParenR"/>
+            </a:pPr>
+            <a:r>
+              <a:rPr lang="en-US" dirty="0"/>
+              <a:t>Determine the number of terms for the following sequence:</a:t>
+            </a:r>
+          </a:p>
+          <a:p>
+            <a:pPr marL="514350" indent="-514350">
+              <a:buNone/>
+            </a:pPr>
+            <a:r>
+              <a:rPr lang="en-US" dirty="0"/>
+              <a:t>				71, 65, 59, …, -13</a:t>
+            </a:r>
+          </a:p>
+          <a:p>
+            <a:pPr marL="227013" indent="-227013">
+              <a:buNone/>
+            </a:pPr>
+            <a:r>
+              <a:rPr lang="en-US" dirty="0"/>
+              <a:t>b)	The fifth term of a geometric sequence is 504 and the first term is 8064. Determine the common ratio and the sum of the first ten terms of the sequence. Assume that the common ratio is positive. </a:t>
             </a:r>
             <a:endParaRPr lang="en-MY" dirty="0"/>
           </a:p>
@@ -15730,248 +16087,6 @@
 </p:sld>
 </file>
 
-<file path=ppt/slides/slide30.xml><?xml version="1.0" encoding="utf-8"?>
-<p:sld xmlns:a="http://schemas.openxmlformats.org/drawingml/2006/main" xmlns:r="http://schemas.openxmlformats.org/officeDocument/2006/relationships" xmlns:p="http://schemas.openxmlformats.org/presentationml/2006/main">
-  <p:cSld>
-    <p:spTree>
-      <p:nvGrpSpPr>
-        <p:cNvPr id="1" name=""/>
-        <p:cNvGrpSpPr/>
-        <p:nvPr/>
-      </p:nvGrpSpPr>
-      <p:grpSpPr>
-        <a:xfrm>
-          <a:off x="0" y="0"/>
-          <a:ext cx="0" cy="0"/>
-          <a:chOff x="0" y="0"/>
-          <a:chExt cx="0" cy="0"/>
-        </a:xfrm>
-      </p:grpSpPr>
-      <p:sp>
-        <p:nvSpPr>
-          <p:cNvPr id="2" name="Title 1"/>
-          <p:cNvSpPr>
-            <a:spLocks noGrp="1"/>
-          </p:cNvSpPr>
-          <p:nvPr>
-            <p:ph type="title"/>
-          </p:nvPr>
-        </p:nvSpPr>
-        <p:spPr/>
-        <p:txBody>
-          <a:bodyPr/>
-          <a:lstStyle/>
-          <a:p>
-            <a:endParaRPr lang="en-MY"/>
-          </a:p>
-        </p:txBody>
-      </p:sp>
-      <p:sp>
-        <p:nvSpPr>
-          <p:cNvPr id="3" name="Content Placeholder 2"/>
-          <p:cNvSpPr>
-            <a:spLocks noGrp="1"/>
-          </p:cNvSpPr>
-          <p:nvPr>
-            <p:ph idx="1"/>
-          </p:nvPr>
-        </p:nvSpPr>
-        <p:spPr/>
-        <p:txBody>
-          <a:bodyPr>
-            <a:normAutofit/>
-          </a:bodyPr>
-          <a:lstStyle/>
-          <a:p>
-            <a:pPr>
-              <a:buNone/>
-            </a:pPr>
-            <a:r>
-              <a:rPr lang="en-US" dirty="0"/>
-              <a:t>SEPT2014</a:t>
-            </a:r>
-          </a:p>
-          <a:p>
-            <a:pPr>
-              <a:buNone/>
-            </a:pPr>
-            <a:endParaRPr lang="en-US" dirty="0"/>
-          </a:p>
-          <a:p>
-            <a:pPr>
-              <a:buNone/>
-            </a:pPr>
-            <a:r>
-              <a:rPr lang="en-MY" dirty="0"/>
-              <a:t>a) Given a sequence: 10, 30, 90, 270, 810, 2430....., find the sum of the first 10 terms</a:t>
-            </a:r>
-          </a:p>
-          <a:p>
-            <a:pPr>
-              <a:buNone/>
-            </a:pPr>
-            <a:endParaRPr lang="en-US" dirty="0"/>
-          </a:p>
-          <a:p>
-            <a:pPr>
-              <a:buNone/>
-            </a:pPr>
-            <a:r>
-              <a:rPr lang="en-US" dirty="0"/>
-              <a:t>b) </a:t>
-            </a:r>
-            <a:r>
-              <a:rPr lang="en-MY" dirty="0"/>
-              <a:t>The fourth term of an arithmetic sequence is less than the fifth term by 3. The seventh term is three times the fifth term. Find </a:t>
-            </a:r>
-          </a:p>
-          <a:p>
-            <a:pPr>
-              <a:buNone/>
-            </a:pPr>
-            <a:r>
-              <a:rPr lang="en-US" dirty="0"/>
-              <a:t>	</a:t>
-            </a:r>
-            <a:r>
-              <a:rPr lang="en-US" dirty="0" err="1"/>
-              <a:t>i</a:t>
-            </a:r>
-            <a:r>
-              <a:rPr lang="en-US" dirty="0"/>
-              <a:t>) t</a:t>
-            </a:r>
-            <a:r>
-              <a:rPr lang="en-MY" dirty="0"/>
-              <a:t>he common difference and the first term</a:t>
-            </a:r>
-          </a:p>
-          <a:p>
-            <a:pPr>
-              <a:buNone/>
-            </a:pPr>
-            <a:r>
-              <a:rPr lang="en-US" dirty="0"/>
-              <a:t>	ii) </a:t>
-            </a:r>
-            <a:r>
-              <a:rPr lang="en-MY" dirty="0"/>
-              <a:t>the sum of the first 12 terms</a:t>
-            </a:r>
-          </a:p>
-        </p:txBody>
-      </p:sp>
-    </p:spTree>
-  </p:cSld>
-  <p:clrMapOvr>
-    <a:masterClrMapping/>
-  </p:clrMapOvr>
-</p:sld>
-</file>
-
-<file path=ppt/slides/slide31.xml><?xml version="1.0" encoding="utf-8"?>
-<p:sld xmlns:a="http://schemas.openxmlformats.org/drawingml/2006/main" xmlns:r="http://schemas.openxmlformats.org/officeDocument/2006/relationships" xmlns:p="http://schemas.openxmlformats.org/presentationml/2006/main">
-  <p:cSld>
-    <p:spTree>
-      <p:nvGrpSpPr>
-        <p:cNvPr id="1" name=""/>
-        <p:cNvGrpSpPr/>
-        <p:nvPr/>
-      </p:nvGrpSpPr>
-      <p:grpSpPr>
-        <a:xfrm>
-          <a:off x="0" y="0"/>
-          <a:ext cx="0" cy="0"/>
-          <a:chOff x="0" y="0"/>
-          <a:chExt cx="0" cy="0"/>
-        </a:xfrm>
-      </p:grpSpPr>
-      <p:sp>
-        <p:nvSpPr>
-          <p:cNvPr id="2" name="Title 1"/>
-          <p:cNvSpPr>
-            <a:spLocks noGrp="1"/>
-          </p:cNvSpPr>
-          <p:nvPr>
-            <p:ph type="title"/>
-          </p:nvPr>
-        </p:nvSpPr>
-        <p:spPr/>
-        <p:txBody>
-          <a:bodyPr/>
-          <a:lstStyle/>
-          <a:p>
-            <a:endParaRPr lang="en-MY"/>
-          </a:p>
-        </p:txBody>
-      </p:sp>
-      <p:sp>
-        <p:nvSpPr>
-          <p:cNvPr id="3" name="Content Placeholder 2"/>
-          <p:cNvSpPr>
-            <a:spLocks noGrp="1"/>
-          </p:cNvSpPr>
-          <p:nvPr>
-            <p:ph idx="1"/>
-          </p:nvPr>
-        </p:nvSpPr>
-        <p:spPr/>
-        <p:txBody>
-          <a:bodyPr/>
-          <a:lstStyle/>
-          <a:p>
-            <a:pPr>
-              <a:buNone/>
-            </a:pPr>
-            <a:r>
-              <a:rPr lang="en-US" dirty="0"/>
-              <a:t>MAC2014</a:t>
-            </a:r>
-          </a:p>
-          <a:p>
-            <a:pPr>
-              <a:buNone/>
-            </a:pPr>
-            <a:endParaRPr lang="en-US" dirty="0"/>
-          </a:p>
-          <a:p>
-            <a:pPr marL="514350" indent="-514350">
-              <a:buAutoNum type="alphaLcParenR"/>
-            </a:pPr>
-            <a:r>
-              <a:rPr lang="en-US" dirty="0"/>
-              <a:t>Determine the number of terms for the following sequence:</a:t>
-            </a:r>
-          </a:p>
-          <a:p>
-            <a:pPr marL="514350" indent="-514350">
-              <a:buNone/>
-            </a:pPr>
-            <a:r>
-              <a:rPr lang="en-US" dirty="0"/>
-              <a:t>				71, 65, 59, …, -13</a:t>
-            </a:r>
-          </a:p>
-          <a:p>
-            <a:pPr marL="514350" indent="-514350">
-              <a:buNone/>
-            </a:pPr>
-            <a:r>
-              <a:rPr lang="en-US" dirty="0"/>
-              <a:t>b)	The fifth term of a geometric sequence is 504 and the first term is 8064. Determine the common ratio and the sum of the first ten terms of the sequence. Assume that the common ratio is positive. </a:t>
-            </a:r>
-            <a:endParaRPr lang="en-MY" dirty="0"/>
-          </a:p>
-        </p:txBody>
-      </p:sp>
-    </p:spTree>
-  </p:cSld>
-  <p:clrMapOvr>
-    <a:masterClrMapping/>
-  </p:clrMapOvr>
-</p:sld>
-</file>
-
 <file path=ppt/slides/slide4.xml><?xml version="1.0" encoding="utf-8"?>
 <p:sld xmlns:a="http://schemas.openxmlformats.org/drawingml/2006/main" xmlns:r="http://schemas.openxmlformats.org/officeDocument/2006/relationships" xmlns:p="http://schemas.openxmlformats.org/presentationml/2006/main">
   <p:cSld>
@@ -16864,7 +16979,7 @@
           <a:graphicData uri="http://schemas.openxmlformats.org/presentationml/2006/ole">
             <mc:AlternateContent xmlns:mc="http://schemas.openxmlformats.org/markup-compatibility/2006">
               <mc:Choice xmlns:v="urn:schemas-microsoft-com:vml" Requires="v">
-                <p:oleObj spid="_x0000_s11280" name="Equation" r:id="rId3" imgW="990360" imgH="228600" progId="Equation.3">
+                <p:oleObj spid="_x0000_s11286" name="Equation" r:id="rId3" imgW="990360" imgH="228600" progId="Equation.3">
                   <p:embed/>
                 </p:oleObj>
               </mc:Choice>
@@ -16940,7 +17055,7 @@
           <a:graphicData uri="http://schemas.openxmlformats.org/presentationml/2006/ole">
             <mc:AlternateContent xmlns:mc="http://schemas.openxmlformats.org/markup-compatibility/2006">
               <mc:Choice xmlns:v="urn:schemas-microsoft-com:vml" Requires="v">
-                <p:oleObj spid="_x0000_s11281" name="Equation" r:id="rId5" imgW="1612800" imgH="1143000" progId="Equation.3">
+                <p:oleObj spid="_x0000_s11287" name="Equation" r:id="rId5" imgW="1612800" imgH="1143000" progId="Equation.3">
                   <p:embed/>
                 </p:oleObj>
               </mc:Choice>
@@ -17245,7 +17360,7 @@
           <a:graphicData uri="http://schemas.openxmlformats.org/presentationml/2006/ole">
             <mc:AlternateContent xmlns:mc="http://schemas.openxmlformats.org/markup-compatibility/2006">
               <mc:Choice xmlns:v="urn:schemas-microsoft-com:vml" Requires="v">
-                <p:oleObj spid="_x0000_s16392" name="Equation" r:id="rId3" imgW="990360" imgH="228600" progId="Equation.3">
+                <p:oleObj spid="_x0000_s16398" name="Equation" r:id="rId3" imgW="990360" imgH="228600" progId="Equation.3">
                   <p:embed/>
                 </p:oleObj>
               </mc:Choice>
@@ -17321,7 +17436,7 @@
           <a:graphicData uri="http://schemas.openxmlformats.org/presentationml/2006/ole">
             <mc:AlternateContent xmlns:mc="http://schemas.openxmlformats.org/markup-compatibility/2006">
               <mc:Choice xmlns:v="urn:schemas-microsoft-com:vml" Requires="v">
-                <p:oleObj spid="_x0000_s16393" name="Equation" r:id="rId5" imgW="1815840" imgH="1143000" progId="Equation.3">
+                <p:oleObj spid="_x0000_s16399" name="Equation" r:id="rId5" imgW="1815840" imgH="1143000" progId="Equation.3">
                   <p:embed/>
                 </p:oleObj>
               </mc:Choice>

</xml_diff>